<commit_message>
remove practice welcome page
</commit_message>
<xml_diff>
--- a/public/img/WMT/WMT_instructions.pptx
+++ b/public/img/WMT/WMT_instructions.pptx
@@ -209,7 +209,7 @@
           <a:p>
             <a:fld id="{92567192-85A7-4BFC-899C-6404A791965D}" type="datetimeFigureOut">
               <a:rPr lang="en-US" smtClean="0"/>
-              <a:t>2/15/2021</a:t>
+              <a:t>3/10/2021</a:t>
             </a:fld>
             <a:endParaRPr lang="en-US"/>
           </a:p>
@@ -694,7 +694,7 @@
           <a:p>
             <a:fld id="{A9621F3F-A60B-4790-965F-DED3750481E9}" type="datetimeFigureOut">
               <a:rPr lang="en-US" smtClean="0"/>
-              <a:t>2/15/2021</a:t>
+              <a:t>3/10/2021</a:t>
             </a:fld>
             <a:endParaRPr lang="en-US"/>
           </a:p>
@@ -864,7 +864,7 @@
           <a:p>
             <a:fld id="{A9621F3F-A60B-4790-965F-DED3750481E9}" type="datetimeFigureOut">
               <a:rPr lang="en-US" smtClean="0"/>
-              <a:t>2/15/2021</a:t>
+              <a:t>3/10/2021</a:t>
             </a:fld>
             <a:endParaRPr lang="en-US"/>
           </a:p>
@@ -1044,7 +1044,7 @@
           <a:p>
             <a:fld id="{A9621F3F-A60B-4790-965F-DED3750481E9}" type="datetimeFigureOut">
               <a:rPr lang="en-US" smtClean="0"/>
-              <a:t>2/15/2021</a:t>
+              <a:t>3/10/2021</a:t>
             </a:fld>
             <a:endParaRPr lang="en-US"/>
           </a:p>
@@ -1214,7 +1214,7 @@
           <a:p>
             <a:fld id="{A9621F3F-A60B-4790-965F-DED3750481E9}" type="datetimeFigureOut">
               <a:rPr lang="en-US" smtClean="0"/>
-              <a:t>2/15/2021</a:t>
+              <a:t>3/10/2021</a:t>
             </a:fld>
             <a:endParaRPr lang="en-US"/>
           </a:p>
@@ -1460,7 +1460,7 @@
           <a:p>
             <a:fld id="{A9621F3F-A60B-4790-965F-DED3750481E9}" type="datetimeFigureOut">
               <a:rPr lang="en-US" smtClean="0"/>
-              <a:t>2/15/2021</a:t>
+              <a:t>3/10/2021</a:t>
             </a:fld>
             <a:endParaRPr lang="en-US"/>
           </a:p>
@@ -1692,7 +1692,7 @@
           <a:p>
             <a:fld id="{A9621F3F-A60B-4790-965F-DED3750481E9}" type="datetimeFigureOut">
               <a:rPr lang="en-US" smtClean="0"/>
-              <a:t>2/15/2021</a:t>
+              <a:t>3/10/2021</a:t>
             </a:fld>
             <a:endParaRPr lang="en-US"/>
           </a:p>
@@ -2059,7 +2059,7 @@
           <a:p>
             <a:fld id="{A9621F3F-A60B-4790-965F-DED3750481E9}" type="datetimeFigureOut">
               <a:rPr lang="en-US" smtClean="0"/>
-              <a:t>2/15/2021</a:t>
+              <a:t>3/10/2021</a:t>
             </a:fld>
             <a:endParaRPr lang="en-US"/>
           </a:p>
@@ -2177,7 +2177,7 @@
           <a:p>
             <a:fld id="{A9621F3F-A60B-4790-965F-DED3750481E9}" type="datetimeFigureOut">
               <a:rPr lang="en-US" smtClean="0"/>
-              <a:t>2/15/2021</a:t>
+              <a:t>3/10/2021</a:t>
             </a:fld>
             <a:endParaRPr lang="en-US"/>
           </a:p>
@@ -2272,7 +2272,7 @@
           <a:p>
             <a:fld id="{A9621F3F-A60B-4790-965F-DED3750481E9}" type="datetimeFigureOut">
               <a:rPr lang="en-US" smtClean="0"/>
-              <a:t>2/15/2021</a:t>
+              <a:t>3/10/2021</a:t>
             </a:fld>
             <a:endParaRPr lang="en-US"/>
           </a:p>
@@ -2549,7 +2549,7 @@
           <a:p>
             <a:fld id="{A9621F3F-A60B-4790-965F-DED3750481E9}" type="datetimeFigureOut">
               <a:rPr lang="en-US" smtClean="0"/>
-              <a:t>2/15/2021</a:t>
+              <a:t>3/10/2021</a:t>
             </a:fld>
             <a:endParaRPr lang="en-US"/>
           </a:p>
@@ -2806,7 +2806,7 @@
           <a:p>
             <a:fld id="{A9621F3F-A60B-4790-965F-DED3750481E9}" type="datetimeFigureOut">
               <a:rPr lang="en-US" smtClean="0"/>
-              <a:t>2/15/2021</a:t>
+              <a:t>3/10/2021</a:t>
             </a:fld>
             <a:endParaRPr lang="en-US"/>
           </a:p>
@@ -3019,7 +3019,7 @@
           <a:p>
             <a:fld id="{A9621F3F-A60B-4790-965F-DED3750481E9}" type="datetimeFigureOut">
               <a:rPr lang="en-US" smtClean="0"/>
-              <a:t>2/15/2021</a:t>
+              <a:t>3/10/2021</a:t>
             </a:fld>
             <a:endParaRPr lang="en-US"/>
           </a:p>
@@ -4604,7 +4604,7 @@
           <a:p>
             <a:r>
               <a:rPr lang="en-SG" dirty="0"/>
-              <a:t>N-back task</a:t>
+              <a:t>Working Memory Task</a:t>
             </a:r>
             <a:endParaRPr lang="en-US" dirty="0"/>
           </a:p>
@@ -4643,7 +4643,7 @@
             </a:pPr>
             <a:r>
               <a:rPr lang="en-SG" sz="3000" dirty="0"/>
-              <a:t>Please put your left index finger on the ‘a’ key, and right index finger on the ‘l’ key</a:t>
+              <a:t>Please put your left index finger on the ‘A’ key, and right index finger on the ‘L’ key</a:t>
             </a:r>
             <a:endParaRPr lang="en-US" sz="3000" dirty="0"/>
           </a:p>
@@ -4817,7 +4817,7 @@
           <a:p>
             <a:r>
               <a:rPr lang="en-SG" dirty="0"/>
-              <a:t>N-back task</a:t>
+              <a:t>Working Memory Task</a:t>
             </a:r>
             <a:endParaRPr lang="en-US" dirty="0"/>
           </a:p>
@@ -9862,10 +9862,10 @@
       </p:sp>
       <p:pic>
         <p:nvPicPr>
-          <p:cNvPr id="5" name="Picture 4" descr="A picture containing object&#10;&#10;Description automatically generated">
+          <p:cNvPr id="9" name="Picture 8" descr="A picture containing object&#10;&#10;Description automatically generated">
             <a:extLst>
               <a:ext uri="{FF2B5EF4-FFF2-40B4-BE49-F238E27FC236}">
-                <a16:creationId xmlns:a16="http://schemas.microsoft.com/office/drawing/2014/main" id="{BC252386-43F5-4005-BB7A-7AB8DBD1530C}"/>
+                <a16:creationId xmlns:a16="http://schemas.microsoft.com/office/drawing/2014/main" id="{6A3A441B-6FF9-44A1-836E-A5102A04AF7C}"/>
               </a:ext>
             </a:extLst>
           </p:cNvPr>
@@ -9882,13 +9882,13 @@
               </a:ext>
             </a:extLst>
           </a:blip>
-          <a:srcRect l="23609" t="14366" r="23510" b="20133"/>
+          <a:srcRect l="22420" t="16030" r="23095" b="22082"/>
           <a:stretch/>
         </p:blipFill>
         <p:spPr>
           <a:xfrm>
-            <a:off x="140264" y="2292096"/>
-            <a:ext cx="1117548" cy="1107419"/>
+            <a:off x="3978568" y="2331890"/>
+            <a:ext cx="1151470" cy="1046340"/>
           </a:xfrm>
           <a:prstGeom prst="rect">
             <a:avLst/>
@@ -9897,10 +9897,10 @@
       </p:pic>
       <p:pic>
         <p:nvPicPr>
-          <p:cNvPr id="9" name="Picture 8" descr="A picture containing object&#10;&#10;Description automatically generated">
+          <p:cNvPr id="10" name="Picture 9" descr="A picture containing object&#10;&#10;Description automatically generated">
             <a:extLst>
               <a:ext uri="{FF2B5EF4-FFF2-40B4-BE49-F238E27FC236}">
-                <a16:creationId xmlns:a16="http://schemas.microsoft.com/office/drawing/2014/main" id="{6A3A441B-6FF9-44A1-836E-A5102A04AF7C}"/>
+                <a16:creationId xmlns:a16="http://schemas.microsoft.com/office/drawing/2014/main" id="{78CF0A7C-3F30-45D9-9B91-E9D37B41657C}"/>
               </a:ext>
             </a:extLst>
           </p:cNvPr>
@@ -9911,41 +9911,6 @@
         </p:nvPicPr>
         <p:blipFill rotWithShape="1">
           <a:blip r:embed="rId3">
-            <a:extLst>
-              <a:ext uri="{28A0092B-C50C-407E-A947-70E740481C1C}">
-                <a14:useLocalDpi xmlns:a14="http://schemas.microsoft.com/office/drawing/2010/main" val="0"/>
-              </a:ext>
-            </a:extLst>
-          </a:blip>
-          <a:srcRect l="22420" t="16030" r="23095" b="22082"/>
-          <a:stretch/>
-        </p:blipFill>
-        <p:spPr>
-          <a:xfrm>
-            <a:off x="3978568" y="2331890"/>
-            <a:ext cx="1151470" cy="1046340"/>
-          </a:xfrm>
-          <a:prstGeom prst="rect">
-            <a:avLst/>
-          </a:prstGeom>
-        </p:spPr>
-      </p:pic>
-      <p:pic>
-        <p:nvPicPr>
-          <p:cNvPr id="10" name="Picture 9" descr="A picture containing object&#10;&#10;Description automatically generated">
-            <a:extLst>
-              <a:ext uri="{FF2B5EF4-FFF2-40B4-BE49-F238E27FC236}">
-                <a16:creationId xmlns:a16="http://schemas.microsoft.com/office/drawing/2014/main" id="{78CF0A7C-3F30-45D9-9B91-E9D37B41657C}"/>
-              </a:ext>
-            </a:extLst>
-          </p:cNvPr>
-          <p:cNvPicPr>
-            <a:picLocks noChangeAspect="1"/>
-          </p:cNvPicPr>
-          <p:nvPr/>
-        </p:nvPicPr>
-        <p:blipFill rotWithShape="1">
-          <a:blip r:embed="rId2">
             <a:extLst>
               <a:ext uri="{28A0092B-C50C-407E-A947-70E740481C1C}">
                 <a14:useLocalDpi xmlns:a14="http://schemas.microsoft.com/office/drawing/2010/main" val="0"/>
@@ -10872,7 +10837,6 @@
           </p:cNvPr>
           <p:cNvCxnSpPr>
             <a:cxnSpLocks/>
-            <a:stCxn id="5" idx="0"/>
             <a:endCxn id="25" idx="0"/>
           </p:cNvCxnSpPr>
           <p:nvPr/>
@@ -10924,7 +10888,7 @@
           <p:nvPr/>
         </p:nvPicPr>
         <p:blipFill rotWithShape="1">
-          <a:blip r:embed="rId3">
+          <a:blip r:embed="rId2">
             <a:extLst>
               <a:ext uri="{28A0092B-C50C-407E-A947-70E740481C1C}">
                 <a14:useLocalDpi xmlns:a14="http://schemas.microsoft.com/office/drawing/2010/main" val="0"/>
@@ -10987,6 +10951,41 @@
           </a:p>
         </p:txBody>
       </p:sp>
+      <p:pic>
+        <p:nvPicPr>
+          <p:cNvPr id="26" name="Picture 25" descr="A picture containing object&#10;&#10;Description automatically generated">
+            <a:extLst>
+              <a:ext uri="{FF2B5EF4-FFF2-40B4-BE49-F238E27FC236}">
+                <a16:creationId xmlns:a16="http://schemas.microsoft.com/office/drawing/2014/main" id="{6236ADFA-83EC-48B0-80B2-38367DD5C29B}"/>
+              </a:ext>
+            </a:extLst>
+          </p:cNvPr>
+          <p:cNvPicPr>
+            <a:picLocks noChangeAspect="1"/>
+          </p:cNvPicPr>
+          <p:nvPr/>
+        </p:nvPicPr>
+        <p:blipFill rotWithShape="1">
+          <a:blip r:embed="rId4">
+            <a:extLst>
+              <a:ext uri="{28A0092B-C50C-407E-A947-70E740481C1C}">
+                <a14:useLocalDpi xmlns:a14="http://schemas.microsoft.com/office/drawing/2010/main" val="0"/>
+              </a:ext>
+            </a:extLst>
+          </a:blip>
+          <a:srcRect l="26517" t="16593" r="26517" b="24238"/>
+          <a:stretch/>
+        </p:blipFill>
+        <p:spPr>
+          <a:xfrm>
+            <a:off x="222327" y="2311437"/>
+            <a:ext cx="1034143" cy="1042278"/>
+          </a:xfrm>
+          <a:prstGeom prst="rect">
+            <a:avLst/>
+          </a:prstGeom>
+        </p:spPr>
+      </p:pic>
     </p:spTree>
     <p:extLst>
       <p:ext uri="{BB962C8B-B14F-4D97-AF65-F5344CB8AC3E}">

</xml_diff>

<commit_message>
correct 3-back instructions error
</commit_message>
<xml_diff>
--- a/public/img/WMT/WMT_instructions.pptx
+++ b/public/img/WMT/WMT_instructions.pptx
@@ -209,7 +209,7 @@
           <a:p>
             <a:fld id="{92567192-85A7-4BFC-899C-6404A791965D}" type="datetimeFigureOut">
               <a:rPr lang="en-US" smtClean="0"/>
-              <a:t>3/10/2021</a:t>
+              <a:t>3/12/2021</a:t>
             </a:fld>
             <a:endParaRPr lang="en-US"/>
           </a:p>
@@ -694,7 +694,7 @@
           <a:p>
             <a:fld id="{A9621F3F-A60B-4790-965F-DED3750481E9}" type="datetimeFigureOut">
               <a:rPr lang="en-US" smtClean="0"/>
-              <a:t>3/10/2021</a:t>
+              <a:t>3/12/2021</a:t>
             </a:fld>
             <a:endParaRPr lang="en-US"/>
           </a:p>
@@ -864,7 +864,7 @@
           <a:p>
             <a:fld id="{A9621F3F-A60B-4790-965F-DED3750481E9}" type="datetimeFigureOut">
               <a:rPr lang="en-US" smtClean="0"/>
-              <a:t>3/10/2021</a:t>
+              <a:t>3/12/2021</a:t>
             </a:fld>
             <a:endParaRPr lang="en-US"/>
           </a:p>
@@ -1044,7 +1044,7 @@
           <a:p>
             <a:fld id="{A9621F3F-A60B-4790-965F-DED3750481E9}" type="datetimeFigureOut">
               <a:rPr lang="en-US" smtClean="0"/>
-              <a:t>3/10/2021</a:t>
+              <a:t>3/12/2021</a:t>
             </a:fld>
             <a:endParaRPr lang="en-US"/>
           </a:p>
@@ -1214,7 +1214,7 @@
           <a:p>
             <a:fld id="{A9621F3F-A60B-4790-965F-DED3750481E9}" type="datetimeFigureOut">
               <a:rPr lang="en-US" smtClean="0"/>
-              <a:t>3/10/2021</a:t>
+              <a:t>3/12/2021</a:t>
             </a:fld>
             <a:endParaRPr lang="en-US"/>
           </a:p>
@@ -1460,7 +1460,7 @@
           <a:p>
             <a:fld id="{A9621F3F-A60B-4790-965F-DED3750481E9}" type="datetimeFigureOut">
               <a:rPr lang="en-US" smtClean="0"/>
-              <a:t>3/10/2021</a:t>
+              <a:t>3/12/2021</a:t>
             </a:fld>
             <a:endParaRPr lang="en-US"/>
           </a:p>
@@ -1692,7 +1692,7 @@
           <a:p>
             <a:fld id="{A9621F3F-A60B-4790-965F-DED3750481E9}" type="datetimeFigureOut">
               <a:rPr lang="en-US" smtClean="0"/>
-              <a:t>3/10/2021</a:t>
+              <a:t>3/12/2021</a:t>
             </a:fld>
             <a:endParaRPr lang="en-US"/>
           </a:p>
@@ -2059,7 +2059,7 @@
           <a:p>
             <a:fld id="{A9621F3F-A60B-4790-965F-DED3750481E9}" type="datetimeFigureOut">
               <a:rPr lang="en-US" smtClean="0"/>
-              <a:t>3/10/2021</a:t>
+              <a:t>3/12/2021</a:t>
             </a:fld>
             <a:endParaRPr lang="en-US"/>
           </a:p>
@@ -2177,7 +2177,7 @@
           <a:p>
             <a:fld id="{A9621F3F-A60B-4790-965F-DED3750481E9}" type="datetimeFigureOut">
               <a:rPr lang="en-US" smtClean="0"/>
-              <a:t>3/10/2021</a:t>
+              <a:t>3/12/2021</a:t>
             </a:fld>
             <a:endParaRPr lang="en-US"/>
           </a:p>
@@ -2272,7 +2272,7 @@
           <a:p>
             <a:fld id="{A9621F3F-A60B-4790-965F-DED3750481E9}" type="datetimeFigureOut">
               <a:rPr lang="en-US" smtClean="0"/>
-              <a:t>3/10/2021</a:t>
+              <a:t>3/12/2021</a:t>
             </a:fld>
             <a:endParaRPr lang="en-US"/>
           </a:p>
@@ -2549,7 +2549,7 @@
           <a:p>
             <a:fld id="{A9621F3F-A60B-4790-965F-DED3750481E9}" type="datetimeFigureOut">
               <a:rPr lang="en-US" smtClean="0"/>
-              <a:t>3/10/2021</a:t>
+              <a:t>3/12/2021</a:t>
             </a:fld>
             <a:endParaRPr lang="en-US"/>
           </a:p>
@@ -2806,7 +2806,7 @@
           <a:p>
             <a:fld id="{A9621F3F-A60B-4790-965F-DED3750481E9}" type="datetimeFigureOut">
               <a:rPr lang="en-US" smtClean="0"/>
-              <a:t>3/10/2021</a:t>
+              <a:t>3/12/2021</a:t>
             </a:fld>
             <a:endParaRPr lang="en-US"/>
           </a:p>
@@ -3019,7 +3019,7 @@
           <a:p>
             <a:fld id="{A9621F3F-A60B-4790-965F-DED3750481E9}" type="datetimeFigureOut">
               <a:rPr lang="en-US" smtClean="0"/>
-              <a:t>3/10/2021</a:t>
+              <a:t>3/12/2021</a:t>
             </a:fld>
             <a:endParaRPr lang="en-US"/>
           </a:p>
@@ -11018,7 +11018,7 @@
                   <a:srgbClr val="FF0000"/>
                 </a:solidFill>
               </a:rPr>
-              <a:t>2</a:t>
+              <a:t>3</a:t>
             </a:r>
             <a:r>
               <a:rPr lang="en-US" sz="2600" dirty="0">
@@ -11063,21 +11063,33 @@
               <a:rPr lang="en-US" sz="2600" dirty="0">
                 <a:latin typeface="+mj-lt"/>
               </a:rPr>
-              <a:t> location from the </a:t>
-            </a:r>
-            <a:r>
-              <a:rPr lang="en-US" sz="2600" b="1" dirty="0">
+              <a:t> location from </a:t>
+            </a:r>
+            <a:r>
+              <a:rPr lang="en-US" sz="2600">
+                <a:latin typeface="+mj-lt"/>
+              </a:rPr>
+              <a:t>the </a:t>
+            </a:r>
+            <a:r>
+              <a:rPr lang="en-US" sz="2600" b="1">
                 <a:solidFill>
                   <a:schemeClr val="accent1"/>
                 </a:solidFill>
               </a:rPr>
-              <a:t>2</a:t>
+              <a:t>3</a:t>
+            </a:r>
+            <a:r>
+              <a:rPr lang="en-US" sz="2600">
+                <a:latin typeface="+mj-lt"/>
+              </a:rPr>
+              <a:t> </a:t>
             </a:r>
             <a:r>
               <a:rPr lang="en-US" sz="2600" dirty="0">
                 <a:latin typeface="+mj-lt"/>
               </a:rPr>
-              <a:t> trials before</a:t>
+              <a:t>trials before</a:t>
             </a:r>
           </a:p>
           <a:p>

</xml_diff>